<commit_message>
Added slides on Scheduling algorithms impl
</commit_message>
<xml_diff>
--- a/MentOS - Process Management.pptx
+++ b/MentOS - Process Management.pptx
@@ -162,6 +162,7 @@
     <p1510:client id="{4AB3D4B1-B6E4-4FB5-A6F3-EC5F1FB80BCA}" v="86" dt="2023-08-20T13:10:26.969"/>
     <p1510:client id="{5CEC7151-7C08-441D-821F-2FFC8FECCEAC}" v="9" dt="2023-08-21T18:15:48.675"/>
     <p1510:client id="{85C0C5A0-9679-4566-8E94-774874BB5338}" v="70" dt="2023-08-20T16:06:46.876"/>
+    <p1510:client id="{A21E4B22-B040-45ED-8CF3-8CC7BB0DD3FE}" v="4" dt="2023-08-27T09:52:39.286"/>
     <p1510:client id="{A6B15BFC-85D5-4357-9537-5F7AA7C4A3F7}" v="108" dt="2023-08-20T13:39:51.206"/>
     <p1510:client id="{F6F52296-290C-4C43-A1AB-A89C9322BE03}" v="42" dt="2023-08-20T14:21:35.035"/>
   </p1510:revLst>
@@ -998,7 +999,7 @@
             <a:rPr lang="it-IT" u="sng" dirty="0">
               <a:latin typeface="Calibri"/>
               <a:cs typeface="Calibri"/>
-              <a:hlinkClick xmlns:r="http://schemas.openxmlformats.org/officeDocument/2006/relationships" r:id=""/>
+              <a:hlinkClick xmlns:r="http://schemas.openxmlformats.org/officeDocument/2006/relationships" r:id="" action="ppaction://noaction"/>
             </a:rPr>
             <a:t>https://mentos-team.github.io/doc/doxygen/index.html</a:t>
           </a:r>
@@ -1739,7 +1740,7 @@
             <a:rPr lang="it-IT" sz="1700" u="sng" kern="1200" dirty="0">
               <a:latin typeface="Calibri"/>
               <a:cs typeface="Calibri"/>
-              <a:hlinkClick xmlns:r="http://schemas.openxmlformats.org/officeDocument/2006/relationships" r:id=""/>
+              <a:hlinkClick xmlns:r="http://schemas.openxmlformats.org/officeDocument/2006/relationships" r:id="" action="ppaction://noaction"/>
             </a:rPr>
             <a:t>https://mentos-team.github.io/doc/doxygen/index.html</a:t>
           </a:r>
@@ -3518,7 +3519,7 @@
           <a:p>
             <a:fld id="{79853C4C-502E-464F-BAA8-27DBB71A0B97}" type="datetimeFigureOut">
               <a:rPr lang="it-IT" smtClean="0"/>
-              <a:t>25/08/2023</a:t>
+              <a:t>27/08/2023</a:t>
             </a:fld>
             <a:endParaRPr lang="it-IT"/>
           </a:p>
@@ -3696,7 +3697,7 @@
           <a:p>
             <a:fld id="{AF56E82B-0561-4374-A755-5D7F376F3791}" type="datetimeFigureOut">
               <a:rPr lang="it-IT" noProof="0" smtClean="0"/>
-              <a:t>25/08/2023</a:t>
+              <a:t>27/08/2023</a:t>
             </a:fld>
             <a:endParaRPr lang="it-IT" noProof="0"/>
           </a:p>
@@ -4376,7 +4377,7 @@
             <a:fld id="{B61BEF0D-F0BB-DE4B-95CE-6DB70DBA9567}" type="datetimeFigureOut">
               <a:rPr lang="en-US" dirty="0"/>
               <a:pPr/>
-              <a:t>8/25/2023</a:t>
+              <a:t>8/27/2023</a:t>
             </a:fld>
             <a:endParaRPr lang="en-US" dirty="0"/>
           </a:p>
@@ -4638,7 +4639,7 @@
             <a:fld id="{B61BEF0D-F0BB-DE4B-95CE-6DB70DBA9567}" type="datetimeFigureOut">
               <a:rPr lang="en-US" dirty="0"/>
               <a:pPr/>
-              <a:t>8/25/2023</a:t>
+              <a:t>8/27/2023</a:t>
             </a:fld>
             <a:endParaRPr lang="en-US" dirty="0"/>
           </a:p>
@@ -4873,7 +4874,7 @@
             <a:fld id="{B61BEF0D-F0BB-DE4B-95CE-6DB70DBA9567}" type="datetimeFigureOut">
               <a:rPr lang="en-US" dirty="0"/>
               <a:pPr/>
-              <a:t>8/25/2023</a:t>
+              <a:t>8/27/2023</a:t>
             </a:fld>
             <a:endParaRPr lang="en-US" dirty="0"/>
           </a:p>
@@ -5113,7 +5114,7 @@
             <a:fld id="{B61BEF0D-F0BB-DE4B-95CE-6DB70DBA9567}" type="datetimeFigureOut">
               <a:rPr lang="en-US" dirty="0"/>
               <a:pPr/>
-              <a:t>8/25/2023</a:t>
+              <a:t>8/27/2023</a:t>
             </a:fld>
             <a:endParaRPr lang="en-US" dirty="0"/>
           </a:p>
@@ -5421,7 +5422,7 @@
             <a:fld id="{B61BEF0D-F0BB-DE4B-95CE-6DB70DBA9567}" type="datetimeFigureOut">
               <a:rPr lang="en-US" dirty="0"/>
               <a:pPr/>
-              <a:t>8/25/2023</a:t>
+              <a:t>8/27/2023</a:t>
             </a:fld>
             <a:endParaRPr lang="en-US" dirty="0"/>
           </a:p>
@@ -5722,7 +5723,7 @@
             <a:fld id="{B61BEF0D-F0BB-DE4B-95CE-6DB70DBA9567}" type="datetimeFigureOut">
               <a:rPr lang="en-US" dirty="0"/>
               <a:pPr/>
-              <a:t>8/25/2023</a:t>
+              <a:t>8/27/2023</a:t>
             </a:fld>
             <a:endParaRPr lang="en-US" dirty="0"/>
           </a:p>
@@ -6143,7 +6144,7 @@
             <a:fld id="{B61BEF0D-F0BB-DE4B-95CE-6DB70DBA9567}" type="datetimeFigureOut">
               <a:rPr lang="en-US" dirty="0"/>
               <a:pPr/>
-              <a:t>8/25/2023</a:t>
+              <a:t>8/27/2023</a:t>
             </a:fld>
             <a:endParaRPr lang="en-US" dirty="0"/>
           </a:p>
@@ -6306,7 +6307,7 @@
             <a:fld id="{B61BEF0D-F0BB-DE4B-95CE-6DB70DBA9567}" type="datetimeFigureOut">
               <a:rPr lang="en-US" dirty="0"/>
               <a:pPr/>
-              <a:t>8/25/2023</a:t>
+              <a:t>8/27/2023</a:t>
             </a:fld>
             <a:endParaRPr lang="en-US" dirty="0"/>
           </a:p>
@@ -6403,7 +6404,7 @@
             <a:fld id="{B61BEF0D-F0BB-DE4B-95CE-6DB70DBA9567}" type="datetimeFigureOut">
               <a:rPr lang="en-US" dirty="0"/>
               <a:pPr/>
-              <a:t>8/25/2023</a:t>
+              <a:t>8/27/2023</a:t>
             </a:fld>
             <a:endParaRPr lang="en-US" dirty="0"/>
           </a:p>
@@ -6781,7 +6782,7 @@
             <a:fld id="{B61BEF0D-F0BB-DE4B-95CE-6DB70DBA9567}" type="datetimeFigureOut">
               <a:rPr lang="en-US" dirty="0"/>
               <a:pPr/>
-              <a:t>8/25/2023</a:t>
+              <a:t>8/27/2023</a:t>
             </a:fld>
             <a:endParaRPr lang="en-US" dirty="0"/>
           </a:p>
@@ -7067,7 +7068,7 @@
             <a:fld id="{B61BEF0D-F0BB-DE4B-95CE-6DB70DBA9567}" type="datetimeFigureOut">
               <a:rPr lang="en-US" dirty="0"/>
               <a:pPr/>
-              <a:t>8/25/2023</a:t>
+              <a:t>8/27/2023</a:t>
             </a:fld>
             <a:endParaRPr lang="en-US" dirty="0"/>
           </a:p>
@@ -7306,7 +7307,7 @@
             <a:fld id="{B61BEF0D-F0BB-DE4B-95CE-6DB70DBA9567}" type="datetimeFigureOut">
               <a:rPr lang="en-US" dirty="0"/>
               <a:pPr/>
-              <a:t>8/25/2023</a:t>
+              <a:t>8/27/2023</a:t>
             </a:fld>
             <a:endParaRPr lang="en-US" dirty="0"/>
           </a:p>
@@ -12938,7 +12939,7 @@
             </a:r>
             <a:r>
               <a:rPr lang="it-IT" dirty="0"/>
-              <a:t>.  L’algoritmo che si occuperà dell’ordinamento delle task  è </a:t>
+              <a:t>.  L’algoritmo che si occuperà dell’ordinamento delle task è </a:t>
             </a:r>
             <a:r>
               <a:rPr lang="it-IT" b="1" dirty="0"/>
@@ -12982,7 +12983,7 @@
             </a:r>
             <a:r>
               <a:rPr lang="it-IT" dirty="0"/>
-              <a:t>in questo caso non farà nulla, quindi la coda di esecuzione rimarrà invariata seguendo quindi un’esecuzione in ordine di ingresse, quindi funzionando come un Round Robin. </a:t>
+              <a:t>in questo caso non farà nulla, quindi la coda di esecuzione rimarrà invariata seguendo quindi un’esecuzione in ordine di ingresso, quindi funzionando come un Round Robin. </a:t>
             </a:r>
           </a:p>
           <a:p>

</xml_diff>